<commit_message>
Adding AOAI policies to the GenAI Workload (#119)
* adding adaptive-rate-limiting using the new policy

* adding usage tracking using app insights

* updating genai-policy with the new apim policies

* capturing custom metrics for aoai policies

* adding docs around the new policies

* updating docs

* updating docs

* limiting the region due to APIM constraint on the rollouts

* limiting the region to francecentral for now

* removed .env file and added that to git ignore

* added additional regions for GenAI support

* removing the allowed list check, and added a note in readme

* updating the permissions for workload function
</commit_message>
<xml_diff>
--- a/docs/assets/genai-capabilities.pptx
+++ b/docs/assets/genai-capabilities.pptx
@@ -270,7 +270,7 @@
           <a:p>
             <a:fld id="{0E3917AB-58D9-AD40-B118-7FAFA4474695}" type="datetimeFigureOut">
               <a:rPr lang="en-US" smtClean="0"/>
-              <a:t>5/17/2024</a:t>
+              <a:t>5/23/24</a:t>
             </a:fld>
             <a:endParaRPr lang="en-US"/>
           </a:p>
@@ -470,7 +470,7 @@
           <a:p>
             <a:fld id="{0E3917AB-58D9-AD40-B118-7FAFA4474695}" type="datetimeFigureOut">
               <a:rPr lang="en-US" smtClean="0"/>
-              <a:t>5/17/2024</a:t>
+              <a:t>5/23/24</a:t>
             </a:fld>
             <a:endParaRPr lang="en-US"/>
           </a:p>
@@ -680,7 +680,7 @@
           <a:p>
             <a:fld id="{0E3917AB-58D9-AD40-B118-7FAFA4474695}" type="datetimeFigureOut">
               <a:rPr lang="en-US" smtClean="0"/>
-              <a:t>5/17/2024</a:t>
+              <a:t>5/23/24</a:t>
             </a:fld>
             <a:endParaRPr lang="en-US"/>
           </a:p>
@@ -880,7 +880,7 @@
           <a:p>
             <a:fld id="{0E3917AB-58D9-AD40-B118-7FAFA4474695}" type="datetimeFigureOut">
               <a:rPr lang="en-US" smtClean="0"/>
-              <a:t>5/17/2024</a:t>
+              <a:t>5/23/24</a:t>
             </a:fld>
             <a:endParaRPr lang="en-US"/>
           </a:p>
@@ -1156,7 +1156,7 @@
           <a:p>
             <a:fld id="{0E3917AB-58D9-AD40-B118-7FAFA4474695}" type="datetimeFigureOut">
               <a:rPr lang="en-US" smtClean="0"/>
-              <a:t>5/17/2024</a:t>
+              <a:t>5/23/24</a:t>
             </a:fld>
             <a:endParaRPr lang="en-US"/>
           </a:p>
@@ -1424,7 +1424,7 @@
           <a:p>
             <a:fld id="{0E3917AB-58D9-AD40-B118-7FAFA4474695}" type="datetimeFigureOut">
               <a:rPr lang="en-US" smtClean="0"/>
-              <a:t>5/17/2024</a:t>
+              <a:t>5/23/24</a:t>
             </a:fld>
             <a:endParaRPr lang="en-US"/>
           </a:p>
@@ -1839,7 +1839,7 @@
           <a:p>
             <a:fld id="{0E3917AB-58D9-AD40-B118-7FAFA4474695}" type="datetimeFigureOut">
               <a:rPr lang="en-US" smtClean="0"/>
-              <a:t>5/17/2024</a:t>
+              <a:t>5/23/24</a:t>
             </a:fld>
             <a:endParaRPr lang="en-US"/>
           </a:p>
@@ -1981,7 +1981,7 @@
           <a:p>
             <a:fld id="{0E3917AB-58D9-AD40-B118-7FAFA4474695}" type="datetimeFigureOut">
               <a:rPr lang="en-US" smtClean="0"/>
-              <a:t>5/17/2024</a:t>
+              <a:t>5/23/24</a:t>
             </a:fld>
             <a:endParaRPr lang="en-US"/>
           </a:p>
@@ -2094,7 +2094,7 @@
           <a:p>
             <a:fld id="{0E3917AB-58D9-AD40-B118-7FAFA4474695}" type="datetimeFigureOut">
               <a:rPr lang="en-US" smtClean="0"/>
-              <a:t>5/17/2024</a:t>
+              <a:t>5/23/24</a:t>
             </a:fld>
             <a:endParaRPr lang="en-US"/>
           </a:p>
@@ -2407,7 +2407,7 @@
           <a:p>
             <a:fld id="{0E3917AB-58D9-AD40-B118-7FAFA4474695}" type="datetimeFigureOut">
               <a:rPr lang="en-US" smtClean="0"/>
-              <a:t>5/17/2024</a:t>
+              <a:t>5/23/24</a:t>
             </a:fld>
             <a:endParaRPr lang="en-US"/>
           </a:p>
@@ -2696,7 +2696,7 @@
           <a:p>
             <a:fld id="{0E3917AB-58D9-AD40-B118-7FAFA4474695}" type="datetimeFigureOut">
               <a:rPr lang="en-US" smtClean="0"/>
-              <a:t>5/17/2024</a:t>
+              <a:t>5/23/24</a:t>
             </a:fld>
             <a:endParaRPr lang="en-US"/>
           </a:p>
@@ -2939,7 +2939,7 @@
           <a:p>
             <a:fld id="{0E3917AB-58D9-AD40-B118-7FAFA4474695}" type="datetimeFigureOut">
               <a:rPr lang="en-US" smtClean="0"/>
-              <a:t>5/17/2024</a:t>
+              <a:t>5/23/24</a:t>
             </a:fld>
             <a:endParaRPr lang="en-US"/>
           </a:p>
@@ -3849,7 +3849,7 @@
                 <a:ea typeface="+mn-lt"/>
                 <a:cs typeface="+mn-lt"/>
               </a:rPr>
-              <a:t>Dynamically rate limit client request based on their token usage requirements and overall consumption.*</a:t>
+              <a:t>Dynamically rate limit client request based on their token usage requirements and overall consumption.</a:t>
             </a:r>
             <a:endParaRPr lang="en-US" sz="1600" dirty="0"/>
           </a:p>
@@ -3937,7 +3937,7 @@
             </a:pPr>
             <a:r>
               <a:rPr lang="en-US" sz="1600" dirty="0"/>
-              <a:t>Track and aggregate token consumption of a service at the desired unit*</a:t>
+              <a:t>Track and aggregate token consumption of a service at the desired unit</a:t>
             </a:r>
             <a:endParaRPr lang="en-US" dirty="0"/>
           </a:p>
@@ -4129,45 +4129,6 @@
               <a:t>Use streaming/non-streaming endpoints of Azure OpenAI</a:t>
             </a:r>
             <a:endParaRPr lang="en-US" dirty="0"/>
-          </a:p>
-        </p:txBody>
-      </p:sp>
-      <p:sp>
-        <p:nvSpPr>
-          <p:cNvPr id="40" name="TextBox 39">
-            <a:extLst>
-              <a:ext uri="{FF2B5EF4-FFF2-40B4-BE49-F238E27FC236}">
-                <a16:creationId xmlns:a16="http://schemas.microsoft.com/office/drawing/2014/main" id="{E874461E-D855-89FE-A020-1EA3C696E607}"/>
-              </a:ext>
-            </a:extLst>
-          </p:cNvPr>
-          <p:cNvSpPr txBox="1"/>
-          <p:nvPr/>
-        </p:nvSpPr>
-        <p:spPr>
-          <a:xfrm>
-            <a:off x="585216" y="6345936"/>
-            <a:ext cx="6623223" cy="369332"/>
-          </a:xfrm>
-          <a:prstGeom prst="rect">
-            <a:avLst/>
-          </a:prstGeom>
-          <a:noFill/>
-        </p:spPr>
-        <p:txBody>
-          <a:bodyPr wrap="none" rtlCol="0">
-            <a:spAutoFit/>
-          </a:bodyPr>
-          <a:lstStyle/>
-          <a:p>
-            <a:r>
-              <a:rPr lang="en-US" dirty="0"/>
-              <a:t>* </a:t>
-            </a:r>
-            <a:r>
-              <a:rPr lang="en-US" sz="1400" i="1" dirty="0"/>
-              <a:t>doesn’t support streaming endpoints yet. planned for post MSFT build 2024 event.</a:t>
-            </a:r>
           </a:p>
         </p:txBody>
       </p:sp>

</xml_diff>